<commit_message>
Java 2 - Ajustes da segunda aula
</commit_message>
<xml_diff>
--- a/2-Java-Programmer-Modulo-II/08.Capitulo02.pptx
+++ b/2-Java-Programmer-Modulo-II/08.Capitulo02.pptx
@@ -262,7 +262,7 @@
               <a:pPr>
                 <a:defRPr/>
               </a:pPr>
-              <a:t>05/05/2012</a:t>
+              <a:t>19/05/2012</a:t>
             </a:fld>
             <a:endParaRPr lang="pt-BR"/>
           </a:p>
@@ -2275,7 +2275,7 @@
               <a:pPr>
                 <a:defRPr/>
               </a:pPr>
-              <a:t>05/05/2012</a:t>
+              <a:t>19/05/2012</a:t>
             </a:fld>
             <a:endParaRPr lang="pt-BR"/>
           </a:p>
@@ -2467,7 +2467,7 @@
               <a:pPr>
                 <a:defRPr/>
               </a:pPr>
-              <a:t>05/05/2012</a:t>
+              <a:t>19/05/2012</a:t>
             </a:fld>
             <a:endParaRPr lang="pt-BR"/>
           </a:p>
@@ -2669,7 +2669,7 @@
               <a:pPr>
                 <a:defRPr/>
               </a:pPr>
-              <a:t>05/05/2012</a:t>
+              <a:t>19/05/2012</a:t>
             </a:fld>
             <a:endParaRPr lang="pt-BR"/>
           </a:p>
@@ -2865,7 +2865,7 @@
               <a:pPr>
                 <a:defRPr/>
               </a:pPr>
-              <a:t>05/05/2012</a:t>
+              <a:t>19/05/2012</a:t>
             </a:fld>
             <a:endParaRPr lang="pt-BR"/>
           </a:p>
@@ -3371,7 +3371,7 @@
               <a:pPr>
                 <a:defRPr/>
               </a:pPr>
-              <a:t>05/05/2012</a:t>
+              <a:t>19/05/2012</a:t>
             </a:fld>
             <a:endParaRPr lang="pt-BR"/>
           </a:p>
@@ -3662,7 +3662,7 @@
               <a:pPr>
                 <a:defRPr/>
               </a:pPr>
-              <a:t>05/05/2012</a:t>
+              <a:t>19/05/2012</a:t>
             </a:fld>
             <a:endParaRPr lang="pt-BR"/>
           </a:p>
@@ -4063,7 +4063,7 @@
               <a:pPr>
                 <a:defRPr/>
               </a:pPr>
-              <a:t>05/05/2012</a:t>
+              <a:t>19/05/2012</a:t>
             </a:fld>
             <a:endParaRPr lang="pt-BR"/>
           </a:p>
@@ -4212,7 +4212,7 @@
               <a:pPr>
                 <a:defRPr/>
               </a:pPr>
-              <a:t>05/05/2012</a:t>
+              <a:t>19/05/2012</a:t>
             </a:fld>
             <a:endParaRPr lang="pt-BR"/>
           </a:p>
@@ -4329,7 +4329,7 @@
               <a:pPr>
                 <a:defRPr/>
               </a:pPr>
-              <a:t>05/05/2012</a:t>
+              <a:t>19/05/2012</a:t>
             </a:fld>
             <a:endParaRPr lang="pt-BR"/>
           </a:p>
@@ -4605,7 +4605,7 @@
               <a:pPr>
                 <a:defRPr/>
               </a:pPr>
-              <a:t>05/05/2012</a:t>
+              <a:t>19/05/2012</a:t>
             </a:fld>
             <a:endParaRPr lang="pt-BR"/>
           </a:p>
@@ -4889,7 +4889,7 @@
               <a:pPr>
                 <a:defRPr/>
               </a:pPr>
-              <a:t>05/05/2012</a:t>
+              <a:t>19/05/2012</a:t>
             </a:fld>
             <a:endParaRPr lang="pt-BR"/>
           </a:p>
@@ -5367,7 +5367,7 @@
               <a:pPr>
                 <a:defRPr/>
               </a:pPr>
-              <a:t>05/05/2012</a:t>
+              <a:t>19/05/2012</a:t>
             </a:fld>
             <a:endParaRPr lang="pt-BR"/>
           </a:p>
@@ -5958,15 +5958,7 @@
             </a:br>
             <a:r>
               <a:rPr lang="pt-BR" sz="1800" cap="none" dirty="0" smtClean="0"/>
-              <a:t>Pág. </a:t>
-            </a:r>
-            <a:r>
-              <a:rPr lang="pt-BR" sz="1800" cap="none" dirty="0" smtClean="0"/>
-              <a:t>87 a 90</a:t>
-            </a:r>
-            <a:r>
-              <a:rPr lang="pt-BR" sz="1800" cap="none" dirty="0" smtClean="0"/>
-              <a:t/>
+              <a:t>Pág. 87 a 90</a:t>
             </a:r>
             <a:br>
               <a:rPr lang="pt-BR" sz="1800" cap="none" dirty="0" smtClean="0"/>
@@ -8374,15 +8366,43 @@
             </a:pPr>
             <a:r>
               <a:rPr lang="pt-BR" sz="2800" dirty="0" smtClean="0"/>
-              <a:t>Crie em seguida uma classe chamada Start contendo o método </a:t>
-            </a:r>
-            <a:r>
-              <a:rPr lang="pt-BR" sz="2800" dirty="0" err="1" smtClean="0"/>
+              <a:t>Crie em seguida uma classe chamada </a:t>
+            </a:r>
+            <a:r>
+              <a:rPr lang="pt-BR" sz="2800" dirty="0" err="1" smtClean="0">
+                <a:solidFill>
+                  <a:srgbClr val="FFC000"/>
+                </a:solidFill>
+              </a:rPr>
+              <a:t>ExercicioGenerics</a:t>
+            </a:r>
+            <a:r>
+              <a:rPr lang="pt-BR" sz="2800" dirty="0" smtClean="0"/>
+              <a:t> </a:t>
+            </a:r>
+            <a:r>
+              <a:rPr lang="pt-BR" sz="2800" dirty="0" smtClean="0"/>
+              <a:t>contendo o método </a:t>
+            </a:r>
+            <a:r>
+              <a:rPr lang="pt-BR" sz="2800" dirty="0" err="1" smtClean="0">
+                <a:solidFill>
+                  <a:srgbClr val="FFC000"/>
+                </a:solidFill>
+              </a:rPr>
               <a:t>main</a:t>
             </a:r>
             <a:r>
+              <a:rPr lang="pt-BR" sz="2800" dirty="0" smtClean="0">
+                <a:solidFill>
+                  <a:srgbClr val="FFC000"/>
+                </a:solidFill>
+              </a:rPr>
+              <a:t>()</a:t>
+            </a:r>
+            <a:r>
               <a:rPr lang="pt-BR" sz="2800" dirty="0" smtClean="0"/>
-              <a:t>().</a:t>
+              <a:t>.</a:t>
             </a:r>
           </a:p>
           <a:p>
@@ -8444,6 +8464,13 @@
   <p:clrMapOvr>
     <a:masterClrMapping/>
   </p:clrMapOvr>
+  <p:timing>
+    <p:tnLst>
+      <p:par>
+        <p:cTn id="1" dur="indefinite" restart="never" nodeType="tmRoot"/>
+      </p:par>
+    </p:tnLst>
+  </p:timing>
 </p:sld>
 </file>
 
@@ -8770,6 +8797,13 @@
   <p:clrMapOvr>
     <a:masterClrMapping/>
   </p:clrMapOvr>
+  <p:timing>
+    <p:tnLst>
+      <p:par>
+        <p:cTn id="1" dur="indefinite" restart="never" nodeType="tmRoot"/>
+      </p:par>
+    </p:tnLst>
+  </p:timing>
 </p:sld>
 </file>
 
@@ -8857,7 +8891,15 @@
             </a:pPr>
             <a:r>
               <a:rPr lang="pt-BR" dirty="0" smtClean="0"/>
-              <a:t>Recurso extremamente útil na utilização de estruturas de dados</a:t>
+              <a:t>Recurso extremamente útil </a:t>
+            </a:r>
+            <a:r>
+              <a:rPr lang="pt-BR" dirty="0" smtClean="0"/>
+              <a:t>quando trabalhamos com </a:t>
+            </a:r>
+            <a:r>
+              <a:rPr lang="pt-BR" dirty="0" smtClean="0"/>
+              <a:t>estruturas de dados</a:t>
             </a:r>
           </a:p>
         </p:txBody>

</xml_diff>